<commit_message>
mise a jour octobre 2018
</commit_message>
<xml_diff>
--- a/Les_transparent/IHM_Python.pptx
+++ b/Les_transparent/IHM_Python.pptx
@@ -288,7 +288,7 @@
           <a:p>
             <a:fld id="{F3B09E36-4607-432C-A5A8-ECF49ED23085}" type="datetimeFigureOut">
               <a:rPr lang="fr-FR" smtClean="0"/>
-              <a:t>29/03/2016</a:t>
+              <a:t>28/03/2017</a:t>
             </a:fld>
             <a:endParaRPr lang="fr-FR"/>
           </a:p>
@@ -459,7 +459,7 @@
             <a:fld id="{2FFE8E1C-2662-4E6E-A1FD-77715E78031E}" type="datetimeFigureOut">
               <a:rPr lang="en-US" smtClean="0"/>
               <a:pPr/>
-              <a:t>3/29/2016</a:t>
+              <a:t>3/28/2017</a:t>
             </a:fld>
             <a:endParaRPr lang="en-US"/>
           </a:p>
@@ -3414,7 +3414,7 @@
           <p:cNvPicPr>
             <a:picLocks noChangeAspect="1"/>
           </p:cNvPicPr>
-          <p:nvPr userDrawn="1"/>
+          <p:nvPr/>
         </p:nvPicPr>
         <p:blipFill>
           <a:blip r:embed="rId12"/>
@@ -3438,7 +3438,7 @@
           <p:cNvPicPr>
             <a:picLocks noChangeAspect="1"/>
           </p:cNvPicPr>
-          <p:nvPr userDrawn="1"/>
+          <p:nvPr/>
         </p:nvPicPr>
         <p:blipFill>
           <a:blip r:embed="rId13"/>
@@ -3462,7 +3462,7 @@
           <p:cNvPicPr>
             <a:picLocks noChangeAspect="1"/>
           </p:cNvPicPr>
-          <p:nvPr userDrawn="1"/>
+          <p:nvPr/>
         </p:nvPicPr>
         <p:blipFill>
           <a:blip r:embed="rId14"/>
@@ -3484,7 +3484,7 @@
         <p:nvSpPr>
           <p:cNvPr id="10" name="TextBox 4"/>
           <p:cNvSpPr txBox="1"/>
-          <p:nvPr userDrawn="1"/>
+          <p:nvPr/>
         </p:nvSpPr>
         <p:spPr>
           <a:xfrm>
@@ -3530,7 +3530,7 @@
         <p:nvSpPr>
           <p:cNvPr id="11" name="TextBox 5"/>
           <p:cNvSpPr txBox="1"/>
-          <p:nvPr userDrawn="1"/>
+          <p:nvPr/>
         </p:nvSpPr>
         <p:spPr>
           <a:xfrm>
@@ -3611,7 +3611,7 @@
         <p:nvSpPr>
           <p:cNvPr id="12" name="TextBox 6"/>
           <p:cNvSpPr txBox="1"/>
-          <p:nvPr userDrawn="1"/>
+          <p:nvPr/>
         </p:nvSpPr>
         <p:spPr>
           <a:xfrm>
@@ -3653,7 +3653,7 @@
         <p:nvSpPr>
           <p:cNvPr id="13" name="TextBox 9"/>
           <p:cNvSpPr txBox="1"/>
-          <p:nvPr userDrawn="1"/>
+          <p:nvPr/>
         </p:nvSpPr>
         <p:spPr>
           <a:xfrm>
@@ -3728,7 +3728,7 @@
         <p:nvSpPr>
           <p:cNvPr id="14" name="TextBox 10"/>
           <p:cNvSpPr txBox="1"/>
-          <p:nvPr userDrawn="1"/>
+          <p:nvPr/>
         </p:nvSpPr>
         <p:spPr>
           <a:xfrm>
@@ -3773,7 +3773,7 @@
         <p:nvSpPr>
           <p:cNvPr id="15" name="TextBox 11"/>
           <p:cNvSpPr txBox="1"/>
-          <p:nvPr userDrawn="1"/>
+          <p:nvPr/>
         </p:nvSpPr>
         <p:spPr>
           <a:xfrm>
@@ -3848,7 +3848,7 @@
         <p:nvSpPr>
           <p:cNvPr id="16" name="TextBox 12"/>
           <p:cNvSpPr txBox="1"/>
-          <p:nvPr userDrawn="1"/>
+          <p:nvPr/>
         </p:nvSpPr>
         <p:spPr>
           <a:xfrm>
@@ -3881,19 +3881,7 @@
                 </a:solidFill>
                 <a:latin typeface="TypoSlabserif-Light" pitchFamily="2" charset="0"/>
               </a:rPr>
-              <a:t> of </a:t>
-            </a:r>
-            <a:r>
-              <a:rPr lang="en-US" sz="1200" b="1" dirty="0" smtClean="0">
-                <a:solidFill>
-                  <a:schemeClr val="tx1">
-                    <a:lumMod val="50000"/>
-                    <a:lumOff val="50000"/>
-                  </a:schemeClr>
-                </a:solidFill>
-                <a:latin typeface="TypoSlabserif-Light" pitchFamily="2" charset="0"/>
-              </a:rPr>
-              <a:t>40</a:t>
+              <a:t> of 40</a:t>
             </a:r>
             <a:endParaRPr lang="en-US" sz="1200" b="1" dirty="0">
               <a:latin typeface="TypoSlabserif-Light" pitchFamily="2" charset="0"/>
@@ -3909,7 +3897,7 @@
           <p:cNvPicPr>
             <a:picLocks noChangeAspect="1"/>
           </p:cNvPicPr>
-          <p:nvPr userDrawn="1"/>
+          <p:nvPr/>
         </p:nvPicPr>
         <p:blipFill>
           <a:blip r:embed="rId15"/>
@@ -6814,9 +6802,42 @@
             </a:r>
             <a:r>
               <a:rPr lang="fr-FR" sz="2000" dirty="0" smtClean="0">
-                <a:hlinkClick r:id="rId2" tooltip="OpenGL"/>
-              </a:rPr>
-              <a:t>OpenGL</a:t>
+                <a:solidFill>
+                  <a:srgbClr val="92D050"/>
+                </a:solidFill>
+              </a:rPr>
+              <a:t>OpenGL </a:t>
+            </a:r>
+            <a:r>
+              <a:rPr lang="fr-FR" sz="2000" dirty="0" smtClean="0"/>
+              <a:t>;</a:t>
+            </a:r>
+            <a:endParaRPr lang="fr-FR" sz="2000" dirty="0"/>
+          </a:p>
+          <a:p>
+            <a:r>
+              <a:rPr lang="fr-FR" sz="2000" i="1" dirty="0" err="1">
+                <a:solidFill>
+                  <a:srgbClr val="FFFF00"/>
+                </a:solidFill>
+              </a:rPr>
+              <a:t>QtSql</a:t>
+            </a:r>
+            <a:r>
+              <a:rPr lang="fr-FR" sz="2000" dirty="0"/>
+              <a:t> : pour l'utilisation </a:t>
+            </a:r>
+            <a:r>
+              <a:rPr lang="fr-FR" sz="2000" dirty="0" smtClean="0"/>
+              <a:t>de </a:t>
+            </a:r>
+            <a:r>
+              <a:rPr lang="fr-FR" sz="2100" dirty="0">
+                <a:solidFill>
+                  <a:srgbClr val="92D050"/>
+                </a:solidFill>
+              </a:rPr>
+              <a:t>base de données SQL</a:t>
             </a:r>
             <a:r>
               <a:rPr lang="fr-FR" sz="2000" dirty="0"/>
@@ -6830,27 +6851,23 @@
                   <a:srgbClr val="FFFF00"/>
                 </a:solidFill>
               </a:rPr>
-              <a:t>QtSql</a:t>
+              <a:t>QtXml</a:t>
             </a:r>
             <a:r>
               <a:rPr lang="fr-FR" sz="2000" dirty="0"/>
-              <a:t> : pour l'utilisation de </a:t>
-            </a:r>
-            <a:r>
-              <a:rPr lang="fr-FR" sz="2000" dirty="0">
-                <a:hlinkClick r:id="rId3" tooltip="Base de données"/>
-              </a:rPr>
-              <a:t>base de données</a:t>
-            </a:r>
-            <a:r>
-              <a:rPr lang="fr-FR" sz="2000" dirty="0"/>
-              <a:t> </a:t>
-            </a:r>
-            <a:r>
-              <a:rPr lang="fr-FR" sz="2000" dirty="0">
-                <a:hlinkClick r:id="rId4" tooltip="Structured Query Language"/>
-              </a:rPr>
-              <a:t>SQL</a:t>
+              <a:t> : pour la manipulation et la génération de </a:t>
+            </a:r>
+            <a:r>
+              <a:rPr lang="fr-FR" sz="2000" dirty="0" smtClean="0"/>
+              <a:t>fichiers </a:t>
+            </a:r>
+            <a:r>
+              <a:rPr lang="fr-FR" sz="2000" dirty="0" smtClean="0">
+                <a:solidFill>
+                  <a:srgbClr val="92D050"/>
+                </a:solidFill>
+              </a:rPr>
+              <a:t>XML</a:t>
             </a:r>
             <a:r>
               <a:rPr lang="fr-FR" sz="2000" dirty="0"/>
@@ -6864,30 +6881,6 @@
                   <a:srgbClr val="FFFF00"/>
                 </a:solidFill>
               </a:rPr>
-              <a:t>QtXml</a:t>
-            </a:r>
-            <a:r>
-              <a:rPr lang="fr-FR" sz="2000" dirty="0"/>
-              <a:t> : pour la manipulation et la génération de fichiers </a:t>
-            </a:r>
-            <a:r>
-              <a:rPr lang="fr-FR" sz="2000" dirty="0">
-                <a:hlinkClick r:id="rId5" tooltip="Extensible Markup Language"/>
-              </a:rPr>
-              <a:t>XML</a:t>
-            </a:r>
-            <a:r>
-              <a:rPr lang="fr-FR" sz="2000" dirty="0"/>
-              <a:t> ;</a:t>
-            </a:r>
-          </a:p>
-          <a:p>
-            <a:r>
-              <a:rPr lang="fr-FR" sz="2000" i="1" dirty="0" err="1">
-                <a:solidFill>
-                  <a:srgbClr val="FFFF00"/>
-                </a:solidFill>
-              </a:rPr>
               <a:t>QtDesigner</a:t>
             </a:r>
             <a:r>
@@ -6895,12 +6888,24 @@
               <a:t> : pour étendre les fonctionnalités de </a:t>
             </a:r>
             <a:r>
-              <a:rPr lang="fr-FR" sz="2000" dirty="0" err="1"/>
+              <a:rPr lang="fr-FR" sz="2000" dirty="0" err="1">
+                <a:solidFill>
+                  <a:srgbClr val="92D050"/>
+                </a:solidFill>
+              </a:rPr>
               <a:t>Qt</a:t>
             </a:r>
             <a:r>
+              <a:rPr lang="fr-FR" sz="2000" dirty="0">
+                <a:solidFill>
+                  <a:srgbClr val="92D050"/>
+                </a:solidFill>
+              </a:rPr>
+              <a:t> Designer</a:t>
+            </a:r>
+            <a:r>
               <a:rPr lang="fr-FR" sz="2000" dirty="0"/>
-              <a:t> Designer, l'assistant de création d'interfaces graphiques ;</a:t>
+              <a:t>, l'assistant de création d'interfaces graphiques ;</a:t>
             </a:r>
           </a:p>
           <a:p>
@@ -40084,7 +40089,7 @@
                   <a:schemeClr val="bg1"/>
                 </a:solidFill>
               </a:rPr>
-              <a:t> permet  de disposer les composants graphiques dans une </a:t>
+              <a:t> permet  de disposer les composants graphiques dans une grille </a:t>
             </a:r>
             <a:r>
               <a:rPr lang="fr-FR" sz="2000" dirty="0" err="1" smtClean="0">
@@ -40092,7 +40097,7 @@
                   <a:schemeClr val="bg1"/>
                 </a:solidFill>
               </a:rPr>
-              <a:t>grillebidimentielle</a:t>
+              <a:t>bidimentielle</a:t>
             </a:r>
             <a:endParaRPr lang="fr-FR" sz="2000" dirty="0" smtClean="0">
               <a:solidFill>

</xml_diff>